<commit_message>
add aarti and  tanvi's ppt
</commit_message>
<xml_diff>
--- a/Abhishek Gade 22.pptx
+++ b/Abhishek Gade 22.pptx
@@ -260,7 +260,7 @@
           <a:p>
             <a:fld id="{058ABBF3-49A8-4B3F-9773-22E67695BB12}" type="datetimeFigureOut">
               <a:rPr lang="en-US" smtClean="0"/>
-              <a:t>2/28/2025</a:t>
+              <a:t>3/1/2025</a:t>
             </a:fld>
             <a:endParaRPr lang="en-US" dirty="0"/>
           </a:p>
@@ -437,7 +437,7 @@
           <a:p>
             <a:fld id="{F44AAC2B-A50D-4386-849A-6B59FB991B4C}" type="datetimeFigureOut">
               <a:rPr lang="en-US" smtClean="0"/>
-              <a:t>2/28/2025</a:t>
+              <a:t>3/1/2025</a:t>
             </a:fld>
             <a:endParaRPr lang="en-US" dirty="0"/>
           </a:p>
@@ -20926,7 +20926,7 @@
         <p:spPr>
           <a:xfrm>
             <a:off x="5662132" y="4373492"/>
-            <a:ext cx="4933772" cy="1908215"/>
+            <a:ext cx="4933772" cy="2215991"/>
           </a:xfrm>
           <a:prstGeom prst="rect">
             <a:avLst/>
@@ -20974,7 +20974,20 @@
                   </a:schemeClr>
                 </a:solidFill>
               </a:rPr>
-              <a:t>Guide : Madam</a:t>
+              <a:t>Roll No: 22</a:t>
+            </a:r>
+          </a:p>
+          <a:p>
+            <a:pPr algn="ctr"/>
+            <a:r>
+              <a:rPr lang="en-US" sz="2000" dirty="0">
+                <a:solidFill>
+                  <a:schemeClr val="accent2">
+                    <a:lumMod val="50000"/>
+                  </a:schemeClr>
+                </a:solidFill>
+              </a:rPr>
+              <a:t>Guide : Prof. R. S Jadhav Madam</a:t>
             </a:r>
           </a:p>
           <a:p>
@@ -25113,6 +25126,15 @@
 </file>
 
 <file path=customXml/item1.xml><?xml version="1.0" encoding="utf-8"?>
+<?mso-contentType ?>
+<FormTemplates xmlns="http://schemas.microsoft.com/sharepoint/v3/contenttype/forms">
+  <Display>DocumentLibraryForm</Display>
+  <Edit>DocumentLibraryForm</Edit>
+  <New>DocumentLibraryForm</New>
+</FormTemplates>
+</file>
+
+<file path=customXml/item2.xml><?xml version="1.0" encoding="utf-8"?>
 <ct:contentTypeSchema xmlns:ct="http://schemas.microsoft.com/office/2006/metadata/contentType" xmlns:ma="http://schemas.microsoft.com/office/2006/metadata/properties/metaAttributes" ct:_="" ma:_="" ma:contentTypeName="Document" ma:contentTypeID="0x01010079F111ED35F8CC479449609E8A0923A6" ma:contentTypeVersion="28" ma:contentTypeDescription="Create a new document." ma:contentTypeScope="" ma:versionID="60f5a4f2d2b0abadcf532d48ebf9cb71">
   <xsd:schema xmlns:xsd="http://www.w3.org/2001/XMLSchema" xmlns:xs="http://www.w3.org/2001/XMLSchema" xmlns:p="http://schemas.microsoft.com/office/2006/metadata/properties" xmlns:ns1="http://schemas.microsoft.com/sharepoint/v3" xmlns:ns2="71af3243-3dd4-4a8d-8c0d-dd76da1f02a5" xmlns:ns3="16c05727-aa75-4e4a-9b5f-8a80a1165891" xmlns:ns4="230e9df3-be65-4c73-a93b-d1236ebd677e" targetNamespace="http://schemas.microsoft.com/office/2006/metadata/properties" ma:root="true" ma:fieldsID="7dd78129e6a1811f84807ad11c651531" ns1:_="" ns2:_="" ns3:_="" ns4:_="">
     <xsd:import namespace="http://schemas.microsoft.com/sharepoint/v3"/>
@@ -25424,15 +25446,6 @@
 </ct:contentTypeSchema>
 </file>
 
-<file path=customXml/item2.xml><?xml version="1.0" encoding="utf-8"?>
-<?mso-contentType ?>
-<FormTemplates xmlns="http://schemas.microsoft.com/sharepoint/v3/contenttype/forms">
-  <Display>DocumentLibraryForm</Display>
-  <Edit>DocumentLibraryForm</Edit>
-  <New>DocumentLibraryForm</New>
-</FormTemplates>
-</file>
-
 <file path=customXml/item3.xml><?xml version="1.0" encoding="utf-8"?>
 <p:properties xmlns:p="http://schemas.microsoft.com/office/2006/metadata/properties" xmlns:xsi="http://www.w3.org/2001/XMLSchema-instance" xmlns:pc="http://schemas.microsoft.com/office/infopath/2007/PartnerControls">
   <documentManagement>
@@ -25454,6 +25467,14 @@
 </file>
 
 <file path=customXml/itemProps1.xml><?xml version="1.0" encoding="utf-8"?>
+<ds:datastoreItem xmlns:ds="http://schemas.openxmlformats.org/officeDocument/2006/customXml" ds:itemID="{8451406B-581B-4C29-A833-E33D8A6AB075}">
+  <ds:schemaRefs>
+    <ds:schemaRef ds:uri="http://schemas.microsoft.com/sharepoint/v3/contenttype/forms"/>
+  </ds:schemaRefs>
+</ds:datastoreItem>
+</file>
+
+<file path=customXml/itemProps2.xml><?xml version="1.0" encoding="utf-8"?>
 <ds:datastoreItem xmlns:ds="http://schemas.openxmlformats.org/officeDocument/2006/customXml" ds:itemID="{18903D25-5BE2-4D9E-B7D8-BE1DCAE2DC41}">
   <ds:schemaRefs>
     <ds:schemaRef ds:uri="http://schemas.microsoft.com/office/2006/metadata/contentType"/>
@@ -25474,14 +25495,6 @@
 </ds:datastoreItem>
 </file>
 
-<file path=customXml/itemProps2.xml><?xml version="1.0" encoding="utf-8"?>
-<ds:datastoreItem xmlns:ds="http://schemas.openxmlformats.org/officeDocument/2006/customXml" ds:itemID="{8451406B-581B-4C29-A833-E33D8A6AB075}">
-  <ds:schemaRefs>
-    <ds:schemaRef ds:uri="http://schemas.microsoft.com/sharepoint/v3/contenttype/forms"/>
-  </ds:schemaRefs>
-</ds:datastoreItem>
-</file>
-
 <file path=customXml/itemProps3.xml><?xml version="1.0" encoding="utf-8"?>
 <ds:datastoreItem xmlns:ds="http://schemas.openxmlformats.org/officeDocument/2006/customXml" ds:itemID="{0F65614A-92F9-4391-AC3D-F3F5B0704F99}">
   <ds:schemaRefs>

</xml_diff>